<commit_message>
drafting introductory slides for collection
</commit_message>
<xml_diff>
--- a/resources/week-1/intro.pptx
+++ b/resources/week-1/intro.pptx
@@ -110,6 +110,11 @@
       </a:defRPr>
     </a:lvl9pPr>
   </p:defaultTextStyle>
+  <p:extLst>
+    <p:ext uri="{EFAFB233-063F-42B5-8137-9DF3F51BA10A}">
+      <p15:sldGuideLst xmlns:p15="http://schemas.microsoft.com/office/powerpoint/2012/main"/>
+    </p:ext>
+  </p:extLst>
 </p:presentation>
 </file>
 
@@ -260,7 +265,7 @@
           <a:p>
             <a:fld id="{C10BE67A-F089-334D-87AB-102B20234B04}" type="datetimeFigureOut">
               <a:rPr lang="en-US" smtClean="0"/>
-              <a:t>12/10/24</a:t>
+              <a:t>12/12/24</a:t>
             </a:fld>
             <a:endParaRPr lang="en-US"/>
           </a:p>
@@ -458,7 +463,7 @@
           <a:p>
             <a:fld id="{C10BE67A-F089-334D-87AB-102B20234B04}" type="datetimeFigureOut">
               <a:rPr lang="en-US" smtClean="0"/>
-              <a:t>12/10/24</a:t>
+              <a:t>12/12/24</a:t>
             </a:fld>
             <a:endParaRPr lang="en-US"/>
           </a:p>
@@ -666,7 +671,7 @@
           <a:p>
             <a:fld id="{C10BE67A-F089-334D-87AB-102B20234B04}" type="datetimeFigureOut">
               <a:rPr lang="en-US" smtClean="0"/>
-              <a:t>12/10/24</a:t>
+              <a:t>12/12/24</a:t>
             </a:fld>
             <a:endParaRPr lang="en-US"/>
           </a:p>
@@ -903,7 +908,7 @@
           <a:p>
             <a:fld id="{C10BE67A-F089-334D-87AB-102B20234B04}" type="datetimeFigureOut">
               <a:rPr lang="en-US" smtClean="0"/>
-              <a:t>12/10/24</a:t>
+              <a:t>12/12/24</a:t>
             </a:fld>
             <a:endParaRPr lang="en-US"/>
           </a:p>
@@ -1178,7 +1183,7 @@
           <a:p>
             <a:fld id="{C10BE67A-F089-334D-87AB-102B20234B04}" type="datetimeFigureOut">
               <a:rPr lang="en-US" smtClean="0"/>
-              <a:t>12/10/24</a:t>
+              <a:t>12/12/24</a:t>
             </a:fld>
             <a:endParaRPr lang="en-US"/>
           </a:p>
@@ -1443,7 +1448,7 @@
           <a:p>
             <a:fld id="{C10BE67A-F089-334D-87AB-102B20234B04}" type="datetimeFigureOut">
               <a:rPr lang="en-US" smtClean="0"/>
-              <a:t>12/10/24</a:t>
+              <a:t>12/12/24</a:t>
             </a:fld>
             <a:endParaRPr lang="en-US"/>
           </a:p>
@@ -1855,7 +1860,7 @@
           <a:p>
             <a:fld id="{C10BE67A-F089-334D-87AB-102B20234B04}" type="datetimeFigureOut">
               <a:rPr lang="en-US" smtClean="0"/>
-              <a:t>12/10/24</a:t>
+              <a:t>12/12/24</a:t>
             </a:fld>
             <a:endParaRPr lang="en-US"/>
           </a:p>
@@ -1996,7 +2001,7 @@
           <a:p>
             <a:fld id="{C10BE67A-F089-334D-87AB-102B20234B04}" type="datetimeFigureOut">
               <a:rPr lang="en-US" smtClean="0"/>
-              <a:t>12/10/24</a:t>
+              <a:t>12/12/24</a:t>
             </a:fld>
             <a:endParaRPr lang="en-US"/>
           </a:p>
@@ -2109,7 +2114,7 @@
           <a:p>
             <a:fld id="{C10BE67A-F089-334D-87AB-102B20234B04}" type="datetimeFigureOut">
               <a:rPr lang="en-US" smtClean="0"/>
-              <a:t>12/10/24</a:t>
+              <a:t>12/12/24</a:t>
             </a:fld>
             <a:endParaRPr lang="en-US"/>
           </a:p>
@@ -2420,7 +2425,7 @@
           <a:p>
             <a:fld id="{C10BE67A-F089-334D-87AB-102B20234B04}" type="datetimeFigureOut">
               <a:rPr lang="en-US" smtClean="0"/>
-              <a:t>12/10/24</a:t>
+              <a:t>12/12/24</a:t>
             </a:fld>
             <a:endParaRPr lang="en-US"/>
           </a:p>
@@ -2708,7 +2713,7 @@
           <a:p>
             <a:fld id="{C10BE67A-F089-334D-87AB-102B20234B04}" type="datetimeFigureOut">
               <a:rPr lang="en-US" smtClean="0"/>
-              <a:t>12/10/24</a:t>
+              <a:t>12/12/24</a:t>
             </a:fld>
             <a:endParaRPr lang="en-US"/>
           </a:p>
@@ -2949,7 +2954,7 @@
           <a:p>
             <a:fld id="{C10BE67A-F089-334D-87AB-102B20234B04}" type="datetimeFigureOut">
               <a:rPr lang="en-US" smtClean="0"/>
-              <a:t>12/10/24</a:t>
+              <a:t>12/12/24</a:t>
             </a:fld>
             <a:endParaRPr lang="en-US"/>
           </a:p>
@@ -3396,8 +3401,8 @@
           <a:lstStyle/>
           <a:p>
             <a:r>
-              <a:rPr lang="en-US" dirty="0"/>
-              <a:t>LASE 2515</a:t>
+              <a:rPr lang="en-US"/>
+              <a:t>Week 1</a:t>
             </a:r>
             <a:br>
               <a:rPr lang="en-US" dirty="0"/>
@@ -3634,7 +3639,7 @@
           </a:ln>
           <a:extLst>
             <a:ext uri="{C572A759-6A51-4108-AA02-DFA0A04FC94B}">
-              <ma14:wrappingTextBoxFlag xmlns="" xmlns:ma14="http://schemas.microsoft.com/office/mac/drawingml/2011/main" val="1"/>
+              <ma14:wrappingTextBoxFlag xmlns:ma14="http://schemas.microsoft.com/office/mac/drawingml/2011/main" xmlns="" val="1"/>
             </a:ext>
           </a:extLst>
         </p:spPr>
@@ -3939,7 +3944,7 @@
           </a:ln>
           <a:extLst>
             <a:ext uri="{C572A759-6A51-4108-AA02-DFA0A04FC94B}">
-              <ma14:wrappingTextBoxFlag xmlns="" xmlns:ma14="http://schemas.microsoft.com/office/mac/drawingml/2011/main" val="1"/>
+              <ma14:wrappingTextBoxFlag xmlns:ma14="http://schemas.microsoft.com/office/mac/drawingml/2011/main" xmlns="" val="1"/>
             </a:ext>
           </a:extLst>
         </p:spPr>

</xml_diff>